<commit_message>
added final changes to part
</commit_message>
<xml_diff>
--- a/EOS3.pptx
+++ b/EOS3.pptx
@@ -113,6 +113,11 @@
       </a:defRPr>
     </a:lvl9pPr>
   </p:defaultTextStyle>
+  <p:extLst>
+    <p:ext uri="{EFAFB233-063F-42B5-8137-9DF3F51BA10A}">
+      <p15:sldGuideLst xmlns:p15="http://schemas.microsoft.com/office/powerpoint/2012/main"/>
+    </p:ext>
+  </p:extLst>
 </p:presentation>
 </file>
 
@@ -4432,7 +4437,7 @@
               <a:buChar char="Ø"/>
             </a:pPr>
             <a:r>
-              <a:rPr lang="en-US" sz="2400"/>
+              <a:rPr lang="en-US" sz="2400" dirty="0"/>
               <a:t> Create a machine learning algorithm</a:t>
             </a:r>
           </a:p>
@@ -4442,7 +4447,7 @@
               <a:buChar char="Ø"/>
             </a:pPr>
             <a:r>
-              <a:rPr lang="en-US" sz="2400"/>
+              <a:rPr lang="en-US" sz="2400" dirty="0"/>
               <a:t> Cluster bacteria and plastics</a:t>
             </a:r>
           </a:p>
@@ -4452,7 +4457,7 @@
               <a:buChar char="Ø"/>
             </a:pPr>
             <a:r>
-              <a:rPr lang="en-US" sz="2400"/>
+              <a:rPr lang="en-US" sz="2400" dirty="0"/>
               <a:t> Outcome should be useable to show movement of cluster centers</a:t>
             </a:r>
           </a:p>
@@ -4462,10 +4467,10 @@
               <a:buChar char="Ø"/>
             </a:pPr>
             <a:r>
-              <a:rPr lang="en-US" sz="2400"/>
+              <a:rPr lang="en-US" sz="2400" dirty="0"/>
               <a:t> Should have statistics to show quality of outcome</a:t>
             </a:r>
-            <a:endParaRPr lang="en-NL" sz="2400"/>
+            <a:endParaRPr lang="en-NL" sz="2400" dirty="0"/>
           </a:p>
         </p:txBody>
       </p:sp>
@@ -5046,6 +5051,114 @@
           </a:p>
         </p:txBody>
       </p:sp>
+      <p:pic>
+        <p:nvPicPr>
+          <p:cNvPr id="8" name="Picture 7" descr="Chart, scatter chart&#10;&#10;Description automatically generated">
+            <a:extLst>
+              <a:ext uri="{FF2B5EF4-FFF2-40B4-BE49-F238E27FC236}">
+                <a16:creationId xmlns:a16="http://schemas.microsoft.com/office/drawing/2014/main" id="{A3475FF3-7BDC-690C-85B7-EAF5A400E787}"/>
+              </a:ext>
+            </a:extLst>
+          </p:cNvPr>
+          <p:cNvPicPr>
+            <a:picLocks noChangeAspect="1"/>
+          </p:cNvPicPr>
+          <p:nvPr/>
+        </p:nvPicPr>
+        <p:blipFill>
+          <a:blip r:embed="rId2">
+            <a:extLst>
+              <a:ext uri="{28A0092B-C50C-407E-A947-70E740481C1C}">
+                <a14:useLocalDpi xmlns:a14="http://schemas.microsoft.com/office/drawing/2010/main" val="0"/>
+              </a:ext>
+            </a:extLst>
+          </a:blip>
+          <a:stretch>
+            <a:fillRect/>
+          </a:stretch>
+        </p:blipFill>
+        <p:spPr>
+          <a:xfrm>
+            <a:off x="8288594" y="2021882"/>
+            <a:ext cx="2733368" cy="2050026"/>
+          </a:xfrm>
+          <a:prstGeom prst="rect">
+            <a:avLst/>
+          </a:prstGeom>
+        </p:spPr>
+      </p:pic>
+      <p:pic>
+        <p:nvPicPr>
+          <p:cNvPr id="10" name="Picture 9" descr="Chart, scatter chart&#10;&#10;Description automatically generated">
+            <a:extLst>
+              <a:ext uri="{FF2B5EF4-FFF2-40B4-BE49-F238E27FC236}">
+                <a16:creationId xmlns:a16="http://schemas.microsoft.com/office/drawing/2014/main" id="{54E58C1F-6CC4-AB1F-4267-5F6D64EED3E1}"/>
+              </a:ext>
+            </a:extLst>
+          </p:cNvPr>
+          <p:cNvPicPr>
+            <a:picLocks noChangeAspect="1"/>
+          </p:cNvPicPr>
+          <p:nvPr/>
+        </p:nvPicPr>
+        <p:blipFill>
+          <a:blip r:embed="rId3">
+            <a:extLst>
+              <a:ext uri="{28A0092B-C50C-407E-A947-70E740481C1C}">
+                <a14:useLocalDpi xmlns:a14="http://schemas.microsoft.com/office/drawing/2010/main" val="0"/>
+              </a:ext>
+            </a:extLst>
+          </a:blip>
+          <a:stretch>
+            <a:fillRect/>
+          </a:stretch>
+        </p:blipFill>
+        <p:spPr>
+          <a:xfrm>
+            <a:off x="5421829" y="4188794"/>
+            <a:ext cx="2866765" cy="2150074"/>
+          </a:xfrm>
+          <a:prstGeom prst="rect">
+            <a:avLst/>
+          </a:prstGeom>
+        </p:spPr>
+      </p:pic>
+      <p:pic>
+        <p:nvPicPr>
+          <p:cNvPr id="12" name="Picture 11" descr="Chart, scatter chart&#10;&#10;Description automatically generated">
+            <a:extLst>
+              <a:ext uri="{FF2B5EF4-FFF2-40B4-BE49-F238E27FC236}">
+                <a16:creationId xmlns:a16="http://schemas.microsoft.com/office/drawing/2014/main" id="{E4767CA5-E034-5954-2A40-1EBCA59C1A89}"/>
+              </a:ext>
+            </a:extLst>
+          </p:cNvPr>
+          <p:cNvPicPr>
+            <a:picLocks noChangeAspect="1"/>
+          </p:cNvPicPr>
+          <p:nvPr/>
+        </p:nvPicPr>
+        <p:blipFill>
+          <a:blip r:embed="rId4">
+            <a:extLst>
+              <a:ext uri="{28A0092B-C50C-407E-A947-70E740481C1C}">
+                <a14:useLocalDpi xmlns:a14="http://schemas.microsoft.com/office/drawing/2010/main" val="0"/>
+              </a:ext>
+            </a:extLst>
+          </a:blip>
+          <a:stretch>
+            <a:fillRect/>
+          </a:stretch>
+        </p:blipFill>
+        <p:spPr>
+          <a:xfrm>
+            <a:off x="8288594" y="4126862"/>
+            <a:ext cx="2866765" cy="2150074"/>
+          </a:xfrm>
+          <a:prstGeom prst="rect">
+            <a:avLst/>
+          </a:prstGeom>
+        </p:spPr>
+      </p:pic>
     </p:spTree>
   </p:cSld>
   <p:clrMapOvr>
@@ -5207,14 +5320,14 @@
           <a:p>
             <a:pPr lvl="0"/>
             <a:r>
-              <a:rPr lang="en-US">
+              <a:rPr lang="en-US" dirty="0">
                 <a:solidFill>
                   <a:srgbClr val="FFFFFF"/>
                 </a:solidFill>
               </a:rPr>
               <a:t>Algorithm 3: DBSCAN</a:t>
             </a:r>
-            <a:endParaRPr lang="en-NL">
+            <a:endParaRPr lang="en-NL" dirty="0">
               <a:solidFill>
                 <a:srgbClr val="FFFFFF"/>
               </a:solidFill>
@@ -5789,7 +5902,7 @@
             </a:pPr>
             <a:r>
               <a:rPr lang="en-US" dirty="0"/>
-              <a:t> DBSCAN results </a:t>
+              <a:t> HDBSCAN results look promising and are already useable for end result</a:t>
             </a:r>
           </a:p>
           <a:p>

</xml_diff>